<commit_message>
Minor update HW2 * Update ppt and pdf * Update the README.md * Add images of result
</commit_message>
<xml_diff>
--- a/FLASH_HW2/HW2.pptx
+++ b/FLASH_HW2/HW2.pptx
@@ -5,7 +5,7 @@
     <p:sldMasterId id="2147483648" r:id="rId1"/>
   </p:sldMasterIdLst>
   <p:notesMasterIdLst>
-    <p:notesMasterId r:id="rId29"/>
+    <p:notesMasterId r:id="rId30"/>
   </p:notesMasterIdLst>
   <p:sldIdLst>
     <p:sldId id="260" r:id="rId2"/>
@@ -35,6 +35,7 @@
     <p:sldId id="303" r:id="rId26"/>
     <p:sldId id="304" r:id="rId27"/>
     <p:sldId id="305" r:id="rId28"/>
+    <p:sldId id="306" r:id="rId29"/>
   </p:sldIdLst>
   <p:sldSz cx="12192000" cy="6858000"/>
   <p:notesSz cx="6858000" cy="9144000"/>
@@ -8086,7 +8087,7 @@
                   <a:latin typeface="Times New Roman" panose="02020603050405020304" pitchFamily="18" charset="0"/>
                   <a:cs typeface="Times New Roman" panose="02020603050405020304" pitchFamily="18" charset="0"/>
                 </a:rPr>
-                <a:t>nil.gz</a:t>
+                <a:t>nii.gz</a:t>
               </a:r>
               <a:r>
                 <a:rPr lang="en-US" altLang="zh-TW" dirty="0">
@@ -20830,6 +20831,485 @@
 </p:sld>
 </file>
 
+<file path=ppt/slides/slide28.xml><?xml version="1.0" encoding="utf-8"?>
+<p:sld xmlns:a="http://schemas.openxmlformats.org/drawingml/2006/main" xmlns:r="http://schemas.openxmlformats.org/officeDocument/2006/relationships" xmlns:p="http://schemas.openxmlformats.org/presentationml/2006/main">
+  <p:cSld>
+    <p:spTree>
+      <p:nvGrpSpPr>
+        <p:cNvPr id="1" name=""/>
+        <p:cNvGrpSpPr/>
+        <p:nvPr/>
+      </p:nvGrpSpPr>
+      <p:grpSpPr>
+        <a:xfrm>
+          <a:off x="0" y="0"/>
+          <a:ext cx="0" cy="0"/>
+          <a:chOff x="0" y="0"/>
+          <a:chExt cx="0" cy="0"/>
+        </a:xfrm>
+      </p:grpSpPr>
+      <p:sp>
+        <p:nvSpPr>
+          <p:cNvPr id="7" name="矩形 6">
+            <a:extLst>
+              <a:ext uri="{FF2B5EF4-FFF2-40B4-BE49-F238E27FC236}">
+                <a16:creationId xmlns:a16="http://schemas.microsoft.com/office/drawing/2014/main" id="{420303C6-4177-4F4A-BB0F-B11FC72F514B}"/>
+              </a:ext>
+            </a:extLst>
+          </p:cNvPr>
+          <p:cNvSpPr/>
+          <p:nvPr/>
+        </p:nvSpPr>
+        <p:spPr>
+          <a:xfrm>
+            <a:off x="0" y="1235871"/>
+            <a:ext cx="12192000" cy="5066452"/>
+          </a:xfrm>
+          <a:prstGeom prst="rect">
+            <a:avLst/>
+          </a:prstGeom>
+          <a:solidFill>
+            <a:schemeClr val="tx1">
+              <a:lumMod val="65000"/>
+              <a:lumOff val="35000"/>
+            </a:schemeClr>
+          </a:solidFill>
+          <a:ln>
+            <a:noFill/>
+          </a:ln>
+        </p:spPr>
+        <p:style>
+          <a:lnRef idx="2">
+            <a:schemeClr val="dk1">
+              <a:shade val="50000"/>
+            </a:schemeClr>
+          </a:lnRef>
+          <a:fillRef idx="1">
+            <a:schemeClr val="dk1"/>
+          </a:fillRef>
+          <a:effectRef idx="0">
+            <a:schemeClr val="dk1"/>
+          </a:effectRef>
+          <a:fontRef idx="minor">
+            <a:schemeClr val="lt1"/>
+          </a:fontRef>
+        </p:style>
+        <p:txBody>
+          <a:bodyPr rtlCol="0" anchor="ctr"/>
+          <a:lstStyle/>
+          <a:p>
+            <a:pPr algn="ctr"/>
+            <a:endParaRPr lang="zh-TW" altLang="en-US">
+              <a:effectLst>
+                <a:outerShdw blurRad="38100" dist="38100" dir="2700000" algn="tl">
+                  <a:srgbClr val="000000">
+                    <a:alpha val="43137"/>
+                  </a:srgbClr>
+                </a:outerShdw>
+              </a:effectLst>
+            </a:endParaRPr>
+          </a:p>
+        </p:txBody>
+      </p:sp>
+      <p:pic>
+        <p:nvPicPr>
+          <p:cNvPr id="2" name="圖片 1">
+            <a:extLst>
+              <a:ext uri="{FF2B5EF4-FFF2-40B4-BE49-F238E27FC236}">
+                <a16:creationId xmlns:a16="http://schemas.microsoft.com/office/drawing/2014/main" id="{D7C306AC-95C4-4C0A-A09F-4DE561191E54}"/>
+              </a:ext>
+            </a:extLst>
+          </p:cNvPr>
+          <p:cNvPicPr>
+            <a:picLocks noChangeAspect="1"/>
+          </p:cNvPicPr>
+          <p:nvPr/>
+        </p:nvPicPr>
+        <p:blipFill>
+          <a:blip r:embed="rId2" cstate="hqprint">
+            <a:extLst>
+              <a:ext uri="{28A0092B-C50C-407E-A947-70E740481C1C}">
+                <a14:useLocalDpi xmlns:a14="http://schemas.microsoft.com/office/drawing/2010/main" val="0"/>
+              </a:ext>
+            </a:extLst>
+          </a:blip>
+          <a:stretch>
+            <a:fillRect/>
+          </a:stretch>
+        </p:blipFill>
+        <p:spPr>
+          <a:xfrm>
+            <a:off x="9690756" y="6302326"/>
+            <a:ext cx="2580675" cy="555677"/>
+          </a:xfrm>
+          <a:prstGeom prst="rect">
+            <a:avLst/>
+          </a:prstGeom>
+        </p:spPr>
+      </p:pic>
+      <p:sp>
+        <p:nvSpPr>
+          <p:cNvPr id="5" name="標題 2">
+            <a:extLst>
+              <a:ext uri="{FF2B5EF4-FFF2-40B4-BE49-F238E27FC236}">
+                <a16:creationId xmlns:a16="http://schemas.microsoft.com/office/drawing/2014/main" id="{2D9E58C4-7551-4638-ACBF-6D022CAF5A5D}"/>
+              </a:ext>
+            </a:extLst>
+          </p:cNvPr>
+          <p:cNvSpPr txBox="1">
+            <a:spLocks/>
+          </p:cNvSpPr>
+          <p:nvPr/>
+        </p:nvSpPr>
+        <p:spPr>
+          <a:xfrm>
+            <a:off x="3348426" y="2105025"/>
+            <a:ext cx="5495148" cy="1037582"/>
+          </a:xfrm>
+          <a:prstGeom prst="rect">
+            <a:avLst/>
+          </a:prstGeom>
+        </p:spPr>
+        <p:txBody>
+          <a:bodyPr/>
+          <a:lstStyle>
+            <a:lvl1pPr algn="l" defTabSz="914400" rtl="0" eaLnBrk="1" latinLnBrk="0" hangingPunct="1">
+              <a:lnSpc>
+                <a:spcPct val="90000"/>
+              </a:lnSpc>
+              <a:spcBef>
+                <a:spcPct val="0"/>
+              </a:spcBef>
+              <a:buNone/>
+              <a:defRPr sz="4400" kern="1200">
+                <a:solidFill>
+                  <a:schemeClr val="tx1"/>
+                </a:solidFill>
+                <a:latin typeface="+mj-lt"/>
+                <a:ea typeface="+mj-ea"/>
+                <a:cs typeface="+mj-cs"/>
+              </a:defRPr>
+            </a:lvl1pPr>
+          </a:lstStyle>
+          <a:p>
+            <a:pPr algn="ctr"/>
+            <a:r>
+              <a:rPr lang="en-US" altLang="zh-TW" sz="6000" b="1" dirty="0">
+                <a:solidFill>
+                  <a:schemeClr val="bg1"/>
+                </a:solidFill>
+                <a:effectLst>
+                  <a:outerShdw blurRad="38100" dist="38100" dir="2700000" algn="tl">
+                    <a:srgbClr val="000000">
+                      <a:alpha val="43137"/>
+                    </a:srgbClr>
+                  </a:outerShdw>
+                </a:effectLst>
+                <a:latin typeface="Times New Roman" panose="02020603050405020304" pitchFamily="18" charset="0"/>
+                <a:cs typeface="Times New Roman" panose="02020603050405020304" pitchFamily="18" charset="0"/>
+              </a:rPr>
+              <a:t>Q&amp;A</a:t>
+            </a:r>
+            <a:endParaRPr lang="zh-TW" altLang="en-US" sz="6000" b="1" dirty="0">
+              <a:solidFill>
+                <a:schemeClr val="bg1"/>
+              </a:solidFill>
+              <a:effectLst>
+                <a:outerShdw blurRad="38100" dist="38100" dir="2700000" algn="tl">
+                  <a:srgbClr val="000000">
+                    <a:alpha val="43137"/>
+                  </a:srgbClr>
+                </a:outerShdw>
+              </a:effectLst>
+              <a:latin typeface="Times New Roman" panose="02020603050405020304" pitchFamily="18" charset="0"/>
+              <a:cs typeface="Times New Roman" panose="02020603050405020304" pitchFamily="18" charset="0"/>
+            </a:endParaRPr>
+          </a:p>
+        </p:txBody>
+      </p:sp>
+      <p:sp>
+        <p:nvSpPr>
+          <p:cNvPr id="6" name="標題 2">
+            <a:extLst>
+              <a:ext uri="{FF2B5EF4-FFF2-40B4-BE49-F238E27FC236}">
+                <a16:creationId xmlns:a16="http://schemas.microsoft.com/office/drawing/2014/main" id="{5B9AD783-ED47-4EF3-8A57-C02CFD7D06E5}"/>
+              </a:ext>
+            </a:extLst>
+          </p:cNvPr>
+          <p:cNvSpPr txBox="1">
+            <a:spLocks/>
+          </p:cNvSpPr>
+          <p:nvPr/>
+        </p:nvSpPr>
+        <p:spPr>
+          <a:xfrm>
+            <a:off x="3348428" y="3715393"/>
+            <a:ext cx="5495148" cy="1037582"/>
+          </a:xfrm>
+          <a:prstGeom prst="rect">
+            <a:avLst/>
+          </a:prstGeom>
+          <a:effectLst>
+            <a:outerShdw blurRad="50800" dist="50800" dir="2700000" algn="ctr" rotWithShape="0">
+              <a:schemeClr val="bg2">
+                <a:lumMod val="75000"/>
+              </a:schemeClr>
+            </a:outerShdw>
+          </a:effectLst>
+        </p:spPr>
+        <p:txBody>
+          <a:bodyPr vert="horz" lIns="91440" tIns="45720" rIns="91440" bIns="45720" rtlCol="0" anchor="b">
+            <a:noAutofit/>
+          </a:bodyPr>
+          <a:lstStyle>
+            <a:lvl1pPr algn="ctr" defTabSz="914377" rtl="0" eaLnBrk="1" latinLnBrk="0" hangingPunct="1">
+              <a:lnSpc>
+                <a:spcPct val="90000"/>
+              </a:lnSpc>
+              <a:spcBef>
+                <a:spcPct val="0"/>
+              </a:spcBef>
+              <a:buNone/>
+              <a:defRPr sz="3671" b="1" kern="1200">
+                <a:solidFill>
+                  <a:schemeClr val="tx1"/>
+                </a:solidFill>
+                <a:latin typeface="+mj-lt"/>
+                <a:ea typeface="+mj-ea"/>
+                <a:cs typeface="+mj-cs"/>
+              </a:defRPr>
+            </a:lvl1pPr>
+          </a:lstStyle>
+          <a:p>
+            <a:r>
+              <a:rPr lang="en-US" altLang="zh-TW" sz="6000" dirty="0">
+                <a:latin typeface="Times New Roman" panose="02020603050405020304" pitchFamily="18" charset="0"/>
+                <a:cs typeface="Times New Roman" panose="02020603050405020304" pitchFamily="18" charset="0"/>
+              </a:rPr>
+              <a:t>Thanks</a:t>
+            </a:r>
+            <a:endParaRPr lang="zh-TW" altLang="en-US" sz="6000" dirty="0">
+              <a:latin typeface="Times New Roman" panose="02020603050405020304" pitchFamily="18" charset="0"/>
+              <a:cs typeface="Times New Roman" panose="02020603050405020304" pitchFamily="18" charset="0"/>
+            </a:endParaRPr>
+          </a:p>
+        </p:txBody>
+      </p:sp>
+      <p:sp>
+        <p:nvSpPr>
+          <p:cNvPr id="4" name="投影片編號版面配置區 3">
+            <a:extLst>
+              <a:ext uri="{FF2B5EF4-FFF2-40B4-BE49-F238E27FC236}">
+                <a16:creationId xmlns:a16="http://schemas.microsoft.com/office/drawing/2014/main" id="{4C8CDD7F-7A6B-43AA-899D-DF163B236255}"/>
+              </a:ext>
+            </a:extLst>
+          </p:cNvPr>
+          <p:cNvSpPr>
+            <a:spLocks noGrp="1"/>
+          </p:cNvSpPr>
+          <p:nvPr>
+            <p:ph type="sldNum" sz="quarter" idx="12"/>
+          </p:nvPr>
+        </p:nvSpPr>
+        <p:spPr/>
+        <p:txBody>
+          <a:bodyPr/>
+          <a:lstStyle/>
+          <a:p>
+            <a:fld id="{0F7416F7-7A92-427C-82AA-57A1311919BC}" type="slidenum">
+              <a:rPr lang="zh-TW" altLang="en-US" smtClean="0"/>
+              <a:t>27</a:t>
+            </a:fld>
+            <a:endParaRPr lang="zh-TW" altLang="en-US"/>
+          </a:p>
+        </p:txBody>
+      </p:sp>
+      <p:sp>
+        <p:nvSpPr>
+          <p:cNvPr id="8" name="標題 2">
+            <a:extLst>
+              <a:ext uri="{FF2B5EF4-FFF2-40B4-BE49-F238E27FC236}">
+                <a16:creationId xmlns:a16="http://schemas.microsoft.com/office/drawing/2014/main" id="{B178B5F8-011E-4309-99FA-02644383DB91}"/>
+              </a:ext>
+            </a:extLst>
+          </p:cNvPr>
+          <p:cNvSpPr txBox="1">
+            <a:spLocks/>
+          </p:cNvSpPr>
+          <p:nvPr/>
+        </p:nvSpPr>
+        <p:spPr>
+          <a:xfrm>
+            <a:off x="9690756" y="5690373"/>
+            <a:ext cx="1760287" cy="407968"/>
+          </a:xfrm>
+          <a:prstGeom prst="rect">
+            <a:avLst/>
+          </a:prstGeom>
+        </p:spPr>
+        <p:txBody>
+          <a:bodyPr/>
+          <a:lstStyle>
+            <a:lvl1pPr algn="l" defTabSz="914400" rtl="0" eaLnBrk="1" latinLnBrk="0" hangingPunct="1">
+              <a:lnSpc>
+                <a:spcPct val="90000"/>
+              </a:lnSpc>
+              <a:spcBef>
+                <a:spcPct val="0"/>
+              </a:spcBef>
+              <a:buNone/>
+              <a:defRPr sz="4400" kern="1200">
+                <a:solidFill>
+                  <a:schemeClr val="tx1"/>
+                </a:solidFill>
+                <a:latin typeface="+mj-lt"/>
+                <a:ea typeface="+mj-ea"/>
+                <a:cs typeface="+mj-cs"/>
+              </a:defRPr>
+            </a:lvl1pPr>
+          </a:lstStyle>
+          <a:p>
+            <a:pPr algn="ctr"/>
+            <a:r>
+              <a:rPr lang="en-US" altLang="zh-TW" sz="2400" b="1" dirty="0">
+                <a:solidFill>
+                  <a:schemeClr val="bg1"/>
+                </a:solidFill>
+                <a:effectLst>
+                  <a:outerShdw blurRad="38100" dist="38100" dir="2700000" algn="tl">
+                    <a:srgbClr val="000000">
+                      <a:alpha val="43137"/>
+                    </a:srgbClr>
+                  </a:outerShdw>
+                </a:effectLst>
+                <a:latin typeface="Times New Roman" panose="02020603050405020304" pitchFamily="18" charset="0"/>
+                <a:cs typeface="Times New Roman" panose="02020603050405020304" pitchFamily="18" charset="0"/>
+                <a:hlinkClick r:id="rId3">
+                  <a:extLst>
+                    <a:ext uri="{A12FA001-AC4F-418D-AE19-62706E023703}">
+                      <ahyp:hlinkClr xmlns:ahyp="http://schemas.microsoft.com/office/drawing/2018/hyperlinkcolor" val="tx"/>
+                    </a:ext>
+                  </a:extLst>
+                </a:hlinkClick>
+              </a:rPr>
+              <a:t>GitHub</a:t>
+            </a:r>
+            <a:endParaRPr lang="zh-TW" altLang="en-US" sz="2400" b="1" dirty="0">
+              <a:solidFill>
+                <a:schemeClr val="bg1"/>
+              </a:solidFill>
+              <a:effectLst>
+                <a:outerShdw blurRad="38100" dist="38100" dir="2700000" algn="tl">
+                  <a:srgbClr val="000000">
+                    <a:alpha val="43137"/>
+                  </a:srgbClr>
+                </a:outerShdw>
+              </a:effectLst>
+              <a:latin typeface="Times New Roman" panose="02020603050405020304" pitchFamily="18" charset="0"/>
+              <a:cs typeface="Times New Roman" panose="02020603050405020304" pitchFamily="18" charset="0"/>
+            </a:endParaRPr>
+          </a:p>
+        </p:txBody>
+      </p:sp>
+    </p:spTree>
+    <p:extLst>
+      <p:ext uri="{BB962C8B-B14F-4D97-AF65-F5344CB8AC3E}">
+        <p14:creationId xmlns:p14="http://schemas.microsoft.com/office/powerpoint/2010/main" val="328900374"/>
+      </p:ext>
+    </p:extLst>
+  </p:cSld>
+  <p:clrMapOvr>
+    <a:masterClrMapping/>
+  </p:clrMapOvr>
+  <p:timing>
+    <p:tnLst>
+      <p:par>
+        <p:cTn id="1" dur="indefinite" restart="never" nodeType="tmRoot">
+          <p:childTnLst>
+            <p:seq concurrent="1" nextAc="seek">
+              <p:cTn id="2" dur="indefinite" nodeType="mainSeq">
+                <p:childTnLst>
+                  <p:par>
+                    <p:cTn id="3" fill="hold">
+                      <p:stCondLst>
+                        <p:cond delay="indefinite"/>
+                      </p:stCondLst>
+                      <p:childTnLst>
+                        <p:par>
+                          <p:cTn id="4" fill="hold">
+                            <p:stCondLst>
+                              <p:cond delay="0"/>
+                            </p:stCondLst>
+                            <p:childTnLst>
+                              <p:par>
+                                <p:cTn id="5" presetID="10" presetClass="entr" presetSubtype="0" fill="hold" grpId="0" nodeType="clickEffect">
+                                  <p:stCondLst>
+                                    <p:cond delay="0"/>
+                                  </p:stCondLst>
+                                  <p:childTnLst>
+                                    <p:set>
+                                      <p:cBhvr>
+                                        <p:cTn id="6" dur="1" fill="hold">
+                                          <p:stCondLst>
+                                            <p:cond delay="0"/>
+                                          </p:stCondLst>
+                                        </p:cTn>
+                                        <p:tgtEl>
+                                          <p:spTgt spid="6"/>
+                                        </p:tgtEl>
+                                        <p:attrNameLst>
+                                          <p:attrName>style.visibility</p:attrName>
+                                        </p:attrNameLst>
+                                      </p:cBhvr>
+                                      <p:to>
+                                        <p:strVal val="visible"/>
+                                      </p:to>
+                                    </p:set>
+                                    <p:animEffect transition="in" filter="fade">
+                                      <p:cBhvr>
+                                        <p:cTn id="7" dur="500"/>
+                                        <p:tgtEl>
+                                          <p:spTgt spid="6"/>
+                                        </p:tgtEl>
+                                      </p:cBhvr>
+                                    </p:animEffect>
+                                  </p:childTnLst>
+                                </p:cTn>
+                              </p:par>
+                            </p:childTnLst>
+                          </p:cTn>
+                        </p:par>
+                      </p:childTnLst>
+                    </p:cTn>
+                  </p:par>
+                </p:childTnLst>
+              </p:cTn>
+              <p:prevCondLst>
+                <p:cond evt="onPrev" delay="0">
+                  <p:tgtEl>
+                    <p:sldTgt/>
+                  </p:tgtEl>
+                </p:cond>
+              </p:prevCondLst>
+              <p:nextCondLst>
+                <p:cond evt="onNext" delay="0">
+                  <p:tgtEl>
+                    <p:sldTgt/>
+                  </p:tgtEl>
+                </p:cond>
+              </p:nextCondLst>
+            </p:seq>
+          </p:childTnLst>
+        </p:cTn>
+      </p:par>
+    </p:tnLst>
+    <p:bldLst>
+      <p:bldP spid="6" grpId="0"/>
+    </p:bldLst>
+  </p:timing>
+</p:sld>
+</file>
+
 <file path=ppt/slides/slide3.xml><?xml version="1.0" encoding="utf-8"?>
 <p:sld xmlns:a="http://schemas.openxmlformats.org/drawingml/2006/main" xmlns:r="http://schemas.openxmlformats.org/officeDocument/2006/relationships" xmlns:p="http://schemas.openxmlformats.org/presentationml/2006/main">
   <p:cSld>
@@ -22458,8 +22938,8 @@
           </a:prstGeom>
         </p:spPr>
       </p:pic>
-      <mc:AlternateContent xmlns:mc="http://schemas.openxmlformats.org/markup-compatibility/2006">
-        <mc:Choice xmlns:a14="http://schemas.microsoft.com/office/drawing/2010/main" Requires="a14">
+      <mc:AlternateContent xmlns:mc="http://schemas.openxmlformats.org/markup-compatibility/2006" xmlns:a14="http://schemas.microsoft.com/office/drawing/2010/main">
+        <mc:Choice Requires="a14">
           <p:sp>
             <p:nvSpPr>
               <p:cNvPr id="12" name="文字方塊 11">
@@ -22623,7 +23103,7 @@
             </p:txBody>
           </p:sp>
         </mc:Choice>
-        <mc:Fallback>
+        <mc:Fallback xmlns="">
           <p:sp>
             <p:nvSpPr>
               <p:cNvPr id="12" name="文字方塊 11">
@@ -22668,8 +23148,8 @@
           </p:sp>
         </mc:Fallback>
       </mc:AlternateContent>
-      <mc:AlternateContent xmlns:mc="http://schemas.openxmlformats.org/markup-compatibility/2006">
-        <mc:Choice xmlns:a14="http://schemas.microsoft.com/office/drawing/2010/main" Requires="a14">
+      <mc:AlternateContent xmlns:mc="http://schemas.openxmlformats.org/markup-compatibility/2006" xmlns:a14="http://schemas.microsoft.com/office/drawing/2010/main">
+        <mc:Choice Requires="a14">
           <p:sp>
             <p:nvSpPr>
               <p:cNvPr id="15" name="文字方塊 14">
@@ -23021,7 +23501,7 @@
             </p:txBody>
           </p:sp>
         </mc:Choice>
-        <mc:Fallback>
+        <mc:Fallback xmlns="">
           <p:sp>
             <p:nvSpPr>
               <p:cNvPr id="15" name="文字方塊 14">

</xml_diff>

<commit_message>
Update ppt and pdf of HW2
</commit_message>
<xml_diff>
--- a/FLASH_HW2/HW2.pptx
+++ b/FLASH_HW2/HW2.pptx
@@ -12969,8 +12969,8 @@
         </p:nvSpPr>
         <p:spPr>
           <a:xfrm>
-            <a:off x="838199" y="1377120"/>
-            <a:ext cx="1467068" cy="461665"/>
+            <a:off x="727591" y="1377120"/>
+            <a:ext cx="1688284" cy="461665"/>
           </a:xfrm>
           <a:prstGeom prst="rect">
             <a:avLst/>
@@ -12992,7 +12992,7 @@
                 <a:ea typeface="微軟正黑體" panose="020B0604030504040204" pitchFamily="34" charset="-120"/>
                 <a:cs typeface="Times New Roman" panose="02020603050405020304" pitchFamily="18" charset="0"/>
               </a:rPr>
-              <a:t>Dataform</a:t>
+              <a:t>DataFrame</a:t>
             </a:r>
             <a:endParaRPr lang="en-US" altLang="zh-TW" sz="2400" b="1" i="0" dirty="0">
               <a:solidFill>
@@ -15246,8 +15246,8 @@
         </p:nvSpPr>
         <p:spPr>
           <a:xfrm>
-            <a:off x="838199" y="1377120"/>
-            <a:ext cx="1467068" cy="461665"/>
+            <a:off x="727591" y="1377120"/>
+            <a:ext cx="1688284" cy="461665"/>
           </a:xfrm>
           <a:prstGeom prst="rect">
             <a:avLst/>
@@ -15269,7 +15269,7 @@
                 <a:ea typeface="微軟正黑體" panose="020B0604030504040204" pitchFamily="34" charset="-120"/>
                 <a:cs typeface="Times New Roman" panose="02020603050405020304" pitchFamily="18" charset="0"/>
               </a:rPr>
-              <a:t>Dataform</a:t>
+              <a:t>DataFrame</a:t>
             </a:r>
             <a:endParaRPr lang="en-US" altLang="zh-TW" sz="2400" b="1" i="0" dirty="0">
               <a:solidFill>
@@ -17051,8 +17051,8 @@
         </p:nvSpPr>
         <p:spPr>
           <a:xfrm>
-            <a:off x="838199" y="1377120"/>
-            <a:ext cx="1467068" cy="461665"/>
+            <a:off x="727591" y="1377120"/>
+            <a:ext cx="1688284" cy="461665"/>
           </a:xfrm>
           <a:prstGeom prst="rect">
             <a:avLst/>
@@ -17074,7 +17074,7 @@
                 <a:ea typeface="微軟正黑體" panose="020B0604030504040204" pitchFamily="34" charset="-120"/>
                 <a:cs typeface="Times New Roman" panose="02020603050405020304" pitchFamily="18" charset="0"/>
               </a:rPr>
-              <a:t>Dataform</a:t>
+              <a:t>DataFrame</a:t>
             </a:r>
             <a:endParaRPr lang="en-US" altLang="zh-TW" sz="2400" b="1" i="0" dirty="0">
               <a:solidFill>
@@ -17402,8 +17402,8 @@
         </p:nvSpPr>
         <p:spPr>
           <a:xfrm>
-            <a:off x="838199" y="1377120"/>
-            <a:ext cx="1467068" cy="461665"/>
+            <a:off x="727591" y="1377120"/>
+            <a:ext cx="1688284" cy="461665"/>
           </a:xfrm>
           <a:prstGeom prst="rect">
             <a:avLst/>
@@ -17425,7 +17425,7 @@
                 <a:ea typeface="微軟正黑體" panose="020B0604030504040204" pitchFamily="34" charset="-120"/>
                 <a:cs typeface="Times New Roman" panose="02020603050405020304" pitchFamily="18" charset="0"/>
               </a:rPr>
-              <a:t>Dataform</a:t>
+              <a:t>DataFrame</a:t>
             </a:r>
             <a:endParaRPr lang="en-US" altLang="zh-TW" sz="2400" b="1" i="0" dirty="0">
               <a:solidFill>

</xml_diff>